<commit_message>
Update 0313 project04 - 파워포인트 - 기범.pptx
</commit_message>
<xml_diff>
--- a/0 발표용 파워포인트/0313 2차발표/0313 project04 - 파워포인트 - 기범.pptx
+++ b/0 발표용 파워포인트/0313 2차발표/0313 project04 - 파워포인트 - 기범.pptx
@@ -121,7 +121,7 @@
   </p:defaultTextStyle>
   <p:extLst>
     <p:ext uri="{EFAFB233-063F-42B5-8137-9DF3F51BA10A}">
-      <p15:sldGuideLst xmlns:p15="http://schemas.microsoft.com/office/powerpoint/2012/main">
+      <p15:sldGuideLst xmlns:p15="http://schemas.microsoft.com/office/powerpoint/2012/main" xmlns="">
         <p15:guide id="1" orient="horz" pos="2160">
           <p15:clr>
             <a:srgbClr val="A4A3A4"/>
@@ -17672,7 +17672,7 @@
         </p:blipFill>
         <p:spPr>
           <a:xfrm>
-            <a:off x="4429126" y="1221774"/>
+            <a:off x="4429126" y="1793279"/>
             <a:ext cx="7534275" cy="4381500"/>
           </a:xfrm>
           <a:prstGeom prst="rect">
@@ -21283,7 +21283,7 @@
   <a:extraClrSchemeLst/>
   <a:extLst>
     <a:ext uri="{05A4C25C-085E-4340-85A3-A5531E510DB2}">
-      <thm15:themeFamily xmlns:thm15="http://schemas.microsoft.com/office/thememl/2012/main" name="Office Theme" id="{62F939B6-93AF-4DB8-9C6B-D6C7DFDC589F}" vid="{4A3C46E8-61CC-4603-A589-7422A47A8E4A}"/>
+      <thm15:themeFamily xmlns:thm15="http://schemas.microsoft.com/office/thememl/2012/main" xmlns="" name="Office Theme" id="{62F939B6-93AF-4DB8-9C6B-D6C7DFDC589F}" vid="{4A3C46E8-61CC-4603-A589-7422A47A8E4A}"/>
     </a:ext>
   </a:extLst>
 </a:theme>
@@ -21544,7 +21544,7 @@
   <a:extraClrSchemeLst/>
   <a:extLst>
     <a:ext uri="{05A4C25C-085E-4340-85A3-A5531E510DB2}">
-      <thm15:themeFamily xmlns:thm15="http://schemas.microsoft.com/office/thememl/2012/main" name="Office Theme" id="{62F939B6-93AF-4DB8-9C6B-D6C7DFDC589F}" vid="{4A3C46E8-61CC-4603-A589-7422A47A8E4A}"/>
+      <thm15:themeFamily xmlns:thm15="http://schemas.microsoft.com/office/thememl/2012/main" xmlns="" name="Office Theme" id="{62F939B6-93AF-4DB8-9C6B-D6C7DFDC589F}" vid="{4A3C46E8-61CC-4603-A589-7422A47A8E4A}"/>
     </a:ext>
   </a:extLst>
 </a:theme>

</xml_diff>